<commit_message>
Updated text and guides
</commit_message>
<xml_diff>
--- a/assets/downloads/Lesson1-SlidePack-includingActivity3Summary.pptx
+++ b/assets/downloads/Lesson1-SlidePack-includingActivity3Summary.pptx
@@ -144,998 +144,51 @@
 </p:cmAuthorLst>
 </file>
 
-<file path=ppt/revisionInfo.xml><?xml version="1.0" encoding="utf-8"?>
-<p1510:revInfo xmlns:a="http://schemas.openxmlformats.org/drawingml/2006/main" xmlns:r="http://schemas.openxmlformats.org/officeDocument/2006/relationships" xmlns:p1510="http://schemas.microsoft.com/office/powerpoint/2015/10/main">
-  <p1510:revLst>
-    <p1510:client id="{D1783FE9-7518-4E61-9E3A-8AAED7D34DA1}" v="20" dt="2022-03-16T05:59:24.371"/>
-  </p1510:revLst>
-</p1510:revInfo>
-</file>
-
 <file path=ppt/changesInfos/changesInfo1.xml><?xml version="1.0" encoding="utf-8"?>
 <pc:chgInfo xmlns:a="http://schemas.openxmlformats.org/drawingml/2006/main" xmlns:r="http://schemas.openxmlformats.org/officeDocument/2006/relationships" xmlns:ac="http://schemas.microsoft.com/office/drawing/2013/main/command" xmlns:pc="http://schemas.microsoft.com/office/powerpoint/2013/main/command">
   <pc:docChgLst>
-    <pc:chgData name="Treharne, Helen Prof (Computer Science)" userId="eac763e0-0bdd-4604-8d8c-433d2614a816" providerId="ADAL" clId="{52E67F1A-5BC2-43AE-B958-BC014CA07B76}"/>
-    <pc:docChg chg="custSel modSld">
-      <pc:chgData name="Treharne, Helen Prof (Computer Science)" userId="eac763e0-0bdd-4604-8d8c-433d2614a816" providerId="ADAL" clId="{52E67F1A-5BC2-43AE-B958-BC014CA07B76}" dt="2022-02-08T09:04:09.195" v="0" actId="478"/>
+    <pc:chgData name="Treharne, Helen Prof (Computer Science)" userId="eac763e0-0bdd-4604-8d8c-433d2614a816" providerId="ADAL" clId="{BE809B97-A1F8-473E-87A0-864E94C72BD5}"/>
+    <pc:docChg chg="modSld">
+      <pc:chgData name="Treharne, Helen Prof (Computer Science)" userId="eac763e0-0bdd-4604-8d8c-433d2614a816" providerId="ADAL" clId="{BE809B97-A1F8-473E-87A0-864E94C72BD5}" dt="2022-03-21T14:47:08.749" v="18" actId="20577"/>
       <pc:docMkLst>
         <pc:docMk/>
       </pc:docMkLst>
-      <pc:sldChg chg="delSp mod">
-        <pc:chgData name="Treharne, Helen Prof (Computer Science)" userId="eac763e0-0bdd-4604-8d8c-433d2614a816" providerId="ADAL" clId="{52E67F1A-5BC2-43AE-B958-BC014CA07B76}" dt="2022-02-08T09:04:09.195" v="0" actId="478"/>
-        <pc:sldMkLst>
-          <pc:docMk/>
-          <pc:sldMk cId="4245456934" sldId="273"/>
-        </pc:sldMkLst>
-        <pc:spChg chg="del">
-          <ac:chgData name="Treharne, Helen Prof (Computer Science)" userId="eac763e0-0bdd-4604-8d8c-433d2614a816" providerId="ADAL" clId="{52E67F1A-5BC2-43AE-B958-BC014CA07B76}" dt="2022-02-08T09:04:09.195" v="0" actId="478"/>
-          <ac:spMkLst>
-            <pc:docMk/>
-            <pc:sldMk cId="4245456934" sldId="273"/>
-            <ac:spMk id="7" creationId="{92A04BC5-221E-4503-9412-E7633F3AD688}"/>
-          </ac:spMkLst>
-        </pc:spChg>
-        <pc:spChg chg="del">
-          <ac:chgData name="Treharne, Helen Prof (Computer Science)" userId="eac763e0-0bdd-4604-8d8c-433d2614a816" providerId="ADAL" clId="{52E67F1A-5BC2-43AE-B958-BC014CA07B76}" dt="2022-02-08T09:04:09.195" v="0" actId="478"/>
-          <ac:spMkLst>
-            <pc:docMk/>
-            <pc:sldMk cId="4245456934" sldId="273"/>
-            <ac:spMk id="9" creationId="{2E48EAA0-57D5-4F3E-B21C-2E3F8CC906CF}"/>
-          </ac:spMkLst>
-        </pc:spChg>
-        <pc:spChg chg="del">
-          <ac:chgData name="Treharne, Helen Prof (Computer Science)" userId="eac763e0-0bdd-4604-8d8c-433d2614a816" providerId="ADAL" clId="{52E67F1A-5BC2-43AE-B958-BC014CA07B76}" dt="2022-02-08T09:04:09.195" v="0" actId="478"/>
-          <ac:spMkLst>
-            <pc:docMk/>
-            <pc:sldMk cId="4245456934" sldId="273"/>
-            <ac:spMk id="10" creationId="{EE93F3AE-CC57-4395-AAF7-E97E511EA884}"/>
-          </ac:spMkLst>
-        </pc:spChg>
-        <pc:spChg chg="del">
-          <ac:chgData name="Treharne, Helen Prof (Computer Science)" userId="eac763e0-0bdd-4604-8d8c-433d2614a816" providerId="ADAL" clId="{52E67F1A-5BC2-43AE-B958-BC014CA07B76}" dt="2022-02-08T09:04:09.195" v="0" actId="478"/>
-          <ac:spMkLst>
-            <pc:docMk/>
-            <pc:sldMk cId="4245456934" sldId="273"/>
-            <ac:spMk id="11" creationId="{D8288D16-BD77-4865-8929-B96B376EB810}"/>
-          </ac:spMkLst>
-        </pc:spChg>
-        <pc:spChg chg="del">
-          <ac:chgData name="Treharne, Helen Prof (Computer Science)" userId="eac763e0-0bdd-4604-8d8c-433d2614a816" providerId="ADAL" clId="{52E67F1A-5BC2-43AE-B958-BC014CA07B76}" dt="2022-02-08T09:04:09.195" v="0" actId="478"/>
-          <ac:spMkLst>
-            <pc:docMk/>
-            <pc:sldMk cId="4245456934" sldId="273"/>
-            <ac:spMk id="12" creationId="{FCE0B00B-809F-4826-BB2A-73D0F24D7FAA}"/>
-          </ac:spMkLst>
-        </pc:spChg>
-        <pc:spChg chg="del">
-          <ac:chgData name="Treharne, Helen Prof (Computer Science)" userId="eac763e0-0bdd-4604-8d8c-433d2614a816" providerId="ADAL" clId="{52E67F1A-5BC2-43AE-B958-BC014CA07B76}" dt="2022-02-08T09:04:09.195" v="0" actId="478"/>
-          <ac:spMkLst>
-            <pc:docMk/>
-            <pc:sldMk cId="4245456934" sldId="273"/>
-            <ac:spMk id="13" creationId="{50D81367-D4BA-43AD-835E-FB6A3498B94B}"/>
-          </ac:spMkLst>
-        </pc:spChg>
-      </pc:sldChg>
-    </pc:docChg>
-  </pc:docChgLst>
-  <pc:docChgLst>
-    <pc:chgData name="Treharne, Helen Prof (Computer Science)" userId="eac763e0-0bdd-4604-8d8c-433d2614a816" providerId="ADAL" clId="{D1783FE9-7518-4E61-9E3A-8AAED7D34DA1}"/>
-    <pc:docChg chg="undo custSel addSld delSld modSld sldOrd">
-      <pc:chgData name="Treharne, Helen Prof (Computer Science)" userId="eac763e0-0bdd-4604-8d8c-433d2614a816" providerId="ADAL" clId="{D1783FE9-7518-4E61-9E3A-8AAED7D34DA1}" dt="2022-03-16T06:13:31.237" v="4658" actId="20577"/>
-      <pc:docMkLst>
-        <pc:docMk/>
-      </pc:docMkLst>
-      <pc:sldChg chg="delSp modSp mod modNotesTx">
-        <pc:chgData name="Treharne, Helen Prof (Computer Science)" userId="eac763e0-0bdd-4604-8d8c-433d2614a816" providerId="ADAL" clId="{D1783FE9-7518-4E61-9E3A-8AAED7D34DA1}" dt="2022-03-16T05:23:01.101" v="810" actId="20577"/>
-        <pc:sldMkLst>
-          <pc:docMk/>
-          <pc:sldMk cId="2934401408" sldId="263"/>
-        </pc:sldMkLst>
-        <pc:spChg chg="mod">
-          <ac:chgData name="Treharne, Helen Prof (Computer Science)" userId="eac763e0-0bdd-4604-8d8c-433d2614a816" providerId="ADAL" clId="{D1783FE9-7518-4E61-9E3A-8AAED7D34DA1}" dt="2022-03-16T05:22:10.747" v="796" actId="5793"/>
-          <ac:spMkLst>
-            <pc:docMk/>
-            <pc:sldMk cId="2934401408" sldId="263"/>
-            <ac:spMk id="3" creationId="{B6CCDA6D-FDC1-4E53-A9F8-C9046C5B02A8}"/>
-          </ac:spMkLst>
-        </pc:spChg>
-        <pc:spChg chg="del mod">
-          <ac:chgData name="Treharne, Helen Prof (Computer Science)" userId="eac763e0-0bdd-4604-8d8c-433d2614a816" providerId="ADAL" clId="{D1783FE9-7518-4E61-9E3A-8AAED7D34DA1}" dt="2022-03-16T05:22:26.667" v="801" actId="478"/>
-          <ac:spMkLst>
-            <pc:docMk/>
-            <pc:sldMk cId="2934401408" sldId="263"/>
-            <ac:spMk id="5" creationId="{65AEFE92-4E85-425E-BBEA-152DEC762215}"/>
-          </ac:spMkLst>
-        </pc:spChg>
-        <pc:spChg chg="del">
-          <ac:chgData name="Treharne, Helen Prof (Computer Science)" userId="eac763e0-0bdd-4604-8d8c-433d2614a816" providerId="ADAL" clId="{D1783FE9-7518-4E61-9E3A-8AAED7D34DA1}" dt="2022-03-16T05:22:22.046" v="799" actId="478"/>
-          <ac:spMkLst>
-            <pc:docMk/>
-            <pc:sldMk cId="2934401408" sldId="263"/>
-            <ac:spMk id="6" creationId="{5F5C1E44-138E-4901-A763-85E29AF79EE0}"/>
-          </ac:spMkLst>
-        </pc:spChg>
-        <pc:spChg chg="del">
-          <ac:chgData name="Treharne, Helen Prof (Computer Science)" userId="eac763e0-0bdd-4604-8d8c-433d2614a816" providerId="ADAL" clId="{D1783FE9-7518-4E61-9E3A-8AAED7D34DA1}" dt="2022-03-16T05:22:22.046" v="799" actId="478"/>
-          <ac:spMkLst>
-            <pc:docMk/>
-            <pc:sldMk cId="2934401408" sldId="263"/>
-            <ac:spMk id="7" creationId="{FF1D22C1-9D56-4F71-A3C9-6FA5EE90B45F}"/>
-          </ac:spMkLst>
-        </pc:spChg>
-        <pc:spChg chg="del">
-          <ac:chgData name="Treharne, Helen Prof (Computer Science)" userId="eac763e0-0bdd-4604-8d8c-433d2614a816" providerId="ADAL" clId="{D1783FE9-7518-4E61-9E3A-8AAED7D34DA1}" dt="2022-03-16T05:22:22.046" v="799" actId="478"/>
-          <ac:spMkLst>
-            <pc:docMk/>
-            <pc:sldMk cId="2934401408" sldId="263"/>
-            <ac:spMk id="11" creationId="{5F1DC435-5AE4-4667-B45A-6BB2D09B3B95}"/>
-          </ac:spMkLst>
-        </pc:spChg>
-        <pc:spChg chg="del">
-          <ac:chgData name="Treharne, Helen Prof (Computer Science)" userId="eac763e0-0bdd-4604-8d8c-433d2614a816" providerId="ADAL" clId="{D1783FE9-7518-4E61-9E3A-8AAED7D34DA1}" dt="2022-03-16T05:22:22.046" v="799" actId="478"/>
-          <ac:spMkLst>
-            <pc:docMk/>
-            <pc:sldMk cId="2934401408" sldId="263"/>
-            <ac:spMk id="17" creationId="{BBFC95F7-BCFB-460C-BB50-FE0E35334238}"/>
-          </ac:spMkLst>
-        </pc:spChg>
-        <pc:cxnChg chg="del">
-          <ac:chgData name="Treharne, Helen Prof (Computer Science)" userId="eac763e0-0bdd-4604-8d8c-433d2614a816" providerId="ADAL" clId="{D1783FE9-7518-4E61-9E3A-8AAED7D34DA1}" dt="2022-03-16T05:22:13.833" v="797" actId="478"/>
-          <ac:cxnSpMkLst>
-            <pc:docMk/>
-            <pc:sldMk cId="2934401408" sldId="263"/>
-            <ac:cxnSpMk id="14" creationId="{FA28A3EE-21A6-4B8D-82EC-42B5DE9CA74D}"/>
-          </ac:cxnSpMkLst>
-        </pc:cxnChg>
-        <pc:cxnChg chg="del">
-          <ac:chgData name="Treharne, Helen Prof (Computer Science)" userId="eac763e0-0bdd-4604-8d8c-433d2614a816" providerId="ADAL" clId="{D1783FE9-7518-4E61-9E3A-8AAED7D34DA1}" dt="2022-03-16T05:22:16.212" v="798" actId="478"/>
-          <ac:cxnSpMkLst>
-            <pc:docMk/>
-            <pc:sldMk cId="2934401408" sldId="263"/>
-            <ac:cxnSpMk id="15" creationId="{223819D2-AC2B-4BB6-BB6B-F365FF47E082}"/>
-          </ac:cxnSpMkLst>
-        </pc:cxnChg>
-      </pc:sldChg>
-      <pc:sldChg chg="addSp delSp modSp mod modNotesTx">
-        <pc:chgData name="Treharne, Helen Prof (Computer Science)" userId="eac763e0-0bdd-4604-8d8c-433d2614a816" providerId="ADAL" clId="{D1783FE9-7518-4E61-9E3A-8AAED7D34DA1}" dt="2022-03-16T06:06:52.057" v="4252" actId="20577"/>
-        <pc:sldMkLst>
-          <pc:docMk/>
-          <pc:sldMk cId="3588553021" sldId="264"/>
-        </pc:sldMkLst>
-        <pc:spChg chg="mod">
-          <ac:chgData name="Treharne, Helen Prof (Computer Science)" userId="eac763e0-0bdd-4604-8d8c-433d2614a816" providerId="ADAL" clId="{D1783FE9-7518-4E61-9E3A-8AAED7D34DA1}" dt="2022-03-16T06:00:36.775" v="4156" actId="14"/>
-          <ac:spMkLst>
-            <pc:docMk/>
-            <pc:sldMk cId="3588553021" sldId="264"/>
-            <ac:spMk id="3" creationId="{B6CCDA6D-FDC1-4E53-A9F8-C9046C5B02A8}"/>
-          </ac:spMkLst>
-        </pc:spChg>
-        <pc:graphicFrameChg chg="mod modGraphic">
-          <ac:chgData name="Treharne, Helen Prof (Computer Science)" userId="eac763e0-0bdd-4604-8d8c-433d2614a816" providerId="ADAL" clId="{D1783FE9-7518-4E61-9E3A-8AAED7D34DA1}" dt="2022-03-16T06:00:03.005" v="4152" actId="1035"/>
-          <ac:graphicFrameMkLst>
-            <pc:docMk/>
-            <pc:sldMk cId="3588553021" sldId="264"/>
-            <ac:graphicFrameMk id="8" creationId="{7E93C81A-139E-4983-A41A-221EB96311AA}"/>
-          </ac:graphicFrameMkLst>
-        </pc:graphicFrameChg>
-        <pc:picChg chg="del">
-          <ac:chgData name="Treharne, Helen Prof (Computer Science)" userId="eac763e0-0bdd-4604-8d8c-433d2614a816" providerId="ADAL" clId="{D1783FE9-7518-4E61-9E3A-8AAED7D34DA1}" dt="2022-03-16T05:58:50.679" v="4142" actId="478"/>
-          <ac:picMkLst>
-            <pc:docMk/>
-            <pc:sldMk cId="3588553021" sldId="264"/>
-            <ac:picMk id="5" creationId="{5181113E-6509-4F9B-9663-EB8F8CACC9D9}"/>
-          </ac:picMkLst>
-        </pc:picChg>
-        <pc:picChg chg="add mod">
-          <ac:chgData name="Treharne, Helen Prof (Computer Science)" userId="eac763e0-0bdd-4604-8d8c-433d2614a816" providerId="ADAL" clId="{D1783FE9-7518-4E61-9E3A-8AAED7D34DA1}" dt="2022-03-16T05:59:24.371" v="4149"/>
-          <ac:picMkLst>
-            <pc:docMk/>
-            <pc:sldMk cId="3588553021" sldId="264"/>
-            <ac:picMk id="7" creationId="{3B2E387C-881D-4613-84AF-5F63FF74ACE8}"/>
-          </ac:picMkLst>
-        </pc:picChg>
-      </pc:sldChg>
       <pc:sldChg chg="modNotesTx">
-        <pc:chgData name="Treharne, Helen Prof (Computer Science)" userId="eac763e0-0bdd-4604-8d8c-433d2614a816" providerId="ADAL" clId="{D1783FE9-7518-4E61-9E3A-8AAED7D34DA1}" dt="2022-03-16T06:08:02.476" v="4258" actId="20577"/>
-        <pc:sldMkLst>
-          <pc:docMk/>
-          <pc:sldMk cId="3352182054" sldId="266"/>
-        </pc:sldMkLst>
-      </pc:sldChg>
-      <pc:sldChg chg="modNotesTx">
-        <pc:chgData name="Treharne, Helen Prof (Computer Science)" userId="eac763e0-0bdd-4604-8d8c-433d2614a816" providerId="ADAL" clId="{D1783FE9-7518-4E61-9E3A-8AAED7D34DA1}" dt="2022-03-16T05:14:54.690" v="233" actId="20577"/>
-        <pc:sldMkLst>
-          <pc:docMk/>
-          <pc:sldMk cId="3973754919" sldId="267"/>
-        </pc:sldMkLst>
-      </pc:sldChg>
-      <pc:sldChg chg="delSp mod">
-        <pc:chgData name="Treharne, Helen Prof (Computer Science)" userId="eac763e0-0bdd-4604-8d8c-433d2614a816" providerId="ADAL" clId="{D1783FE9-7518-4E61-9E3A-8AAED7D34DA1}" dt="2022-03-16T05:12:51.113" v="67" actId="478"/>
-        <pc:sldMkLst>
-          <pc:docMk/>
-          <pc:sldMk cId="519804754" sldId="268"/>
-        </pc:sldMkLst>
-        <pc:spChg chg="del">
-          <ac:chgData name="Treharne, Helen Prof (Computer Science)" userId="eac763e0-0bdd-4604-8d8c-433d2614a816" providerId="ADAL" clId="{D1783FE9-7518-4E61-9E3A-8AAED7D34DA1}" dt="2022-03-16T05:12:51.113" v="67" actId="478"/>
-          <ac:spMkLst>
-            <pc:docMk/>
-            <pc:sldMk cId="519804754" sldId="268"/>
-            <ac:spMk id="3" creationId="{83DF5EDB-CCE1-47DE-A1EC-FA850FA3E614}"/>
-          </ac:spMkLst>
-        </pc:spChg>
-      </pc:sldChg>
-      <pc:sldChg chg="modNotesTx">
-        <pc:chgData name="Treharne, Helen Prof (Computer Science)" userId="eac763e0-0bdd-4604-8d8c-433d2614a816" providerId="ADAL" clId="{D1783FE9-7518-4E61-9E3A-8AAED7D34DA1}" dt="2022-03-16T06:06:23.776" v="4248" actId="20577"/>
+        <pc:chgData name="Treharne, Helen Prof (Computer Science)" userId="eac763e0-0bdd-4604-8d8c-433d2614a816" providerId="ADAL" clId="{BE809B97-A1F8-473E-87A0-864E94C72BD5}" dt="2022-03-21T09:13:00.487" v="8" actId="20577"/>
         <pc:sldMkLst>
           <pc:docMk/>
           <pc:sldMk cId="2969947770" sldId="271"/>
         </pc:sldMkLst>
       </pc:sldChg>
-      <pc:sldChg chg="modSp mod modNotesTx">
-        <pc:chgData name="Treharne, Helen Prof (Computer Science)" userId="eac763e0-0bdd-4604-8d8c-433d2614a816" providerId="ADAL" clId="{D1783FE9-7518-4E61-9E3A-8AAED7D34DA1}" dt="2022-03-16T05:13:04.224" v="74" actId="20577"/>
-        <pc:sldMkLst>
-          <pc:docMk/>
-          <pc:sldMk cId="4245456934" sldId="273"/>
-        </pc:sldMkLst>
-        <pc:spChg chg="mod">
-          <ac:chgData name="Treharne, Helen Prof (Computer Science)" userId="eac763e0-0bdd-4604-8d8c-433d2614a816" providerId="ADAL" clId="{D1783FE9-7518-4E61-9E3A-8AAED7D34DA1}" dt="2022-03-16T05:12:43.408" v="66" actId="1038"/>
-          <ac:spMkLst>
-            <pc:docMk/>
-            <pc:sldMk cId="4245456934" sldId="273"/>
-            <ac:spMk id="18" creationId="{4A45F355-1A1B-44AC-927D-9FFF6802C900}"/>
-          </ac:spMkLst>
-        </pc:spChg>
-        <pc:grpChg chg="mod">
-          <ac:chgData name="Treharne, Helen Prof (Computer Science)" userId="eac763e0-0bdd-4604-8d8c-433d2614a816" providerId="ADAL" clId="{D1783FE9-7518-4E61-9E3A-8AAED7D34DA1}" dt="2022-03-16T05:12:43.408" v="66" actId="1038"/>
-          <ac:grpSpMkLst>
-            <pc:docMk/>
-            <pc:sldMk cId="4245456934" sldId="273"/>
-            <ac:grpSpMk id="45" creationId="{297F2396-6D5A-4207-B1E5-A40A1CA9CB74}"/>
-          </ac:grpSpMkLst>
-        </pc:grpChg>
-      </pc:sldChg>
-      <pc:sldChg chg="addSp delSp modSp mod modNotesTx">
-        <pc:chgData name="Treharne, Helen Prof (Computer Science)" userId="eac763e0-0bdd-4604-8d8c-433d2614a816" providerId="ADAL" clId="{D1783FE9-7518-4E61-9E3A-8AAED7D34DA1}" dt="2022-03-16T05:59:12.906" v="4144"/>
+      <pc:sldChg chg="modSp mod">
+        <pc:chgData name="Treharne, Helen Prof (Computer Science)" userId="eac763e0-0bdd-4604-8d8c-433d2614a816" providerId="ADAL" clId="{BE809B97-A1F8-473E-87A0-864E94C72BD5}" dt="2022-03-21T14:47:08.749" v="18" actId="20577"/>
         <pc:sldMkLst>
           <pc:docMk/>
           <pc:sldMk cId="1746192444" sldId="276"/>
         </pc:sldMkLst>
         <pc:spChg chg="mod">
-          <ac:chgData name="Treharne, Helen Prof (Computer Science)" userId="eac763e0-0bdd-4604-8d8c-433d2614a816" providerId="ADAL" clId="{D1783FE9-7518-4E61-9E3A-8AAED7D34DA1}" dt="2022-03-16T05:39:58.560" v="2862" actId="20577"/>
+          <ac:chgData name="Treharne, Helen Prof (Computer Science)" userId="eac763e0-0bdd-4604-8d8c-433d2614a816" providerId="ADAL" clId="{BE809B97-A1F8-473E-87A0-864E94C72BD5}" dt="2022-03-21T14:47:08.749" v="18" actId="20577"/>
           <ac:spMkLst>
             <pc:docMk/>
             <pc:sldMk cId="1746192444" sldId="276"/>
             <ac:spMk id="3" creationId="{76F3A915-2D27-4B9C-8145-4EBF1A8E1B1D}"/>
           </ac:spMkLst>
         </pc:spChg>
-        <pc:spChg chg="add del mod">
-          <ac:chgData name="Treharne, Helen Prof (Computer Science)" userId="eac763e0-0bdd-4604-8d8c-433d2614a816" providerId="ADAL" clId="{D1783FE9-7518-4E61-9E3A-8AAED7D34DA1}" dt="2022-03-16T05:50:09.148" v="3985" actId="478"/>
-          <ac:spMkLst>
-            <pc:docMk/>
-            <pc:sldMk cId="1746192444" sldId="276"/>
-            <ac:spMk id="5" creationId="{94284968-FA1F-42EA-8EFB-AA130ED5627F}"/>
-          </ac:spMkLst>
-        </pc:spChg>
-        <pc:spChg chg="add del mod">
-          <ac:chgData name="Treharne, Helen Prof (Computer Science)" userId="eac763e0-0bdd-4604-8d8c-433d2614a816" providerId="ADAL" clId="{D1783FE9-7518-4E61-9E3A-8AAED7D34DA1}" dt="2022-03-16T05:50:11.853" v="3986" actId="478"/>
-          <ac:spMkLst>
-            <pc:docMk/>
-            <pc:sldMk cId="1746192444" sldId="276"/>
-            <ac:spMk id="6" creationId="{ADABA970-5ED3-4AC8-A0C3-70465C46A46E}"/>
-          </ac:spMkLst>
-        </pc:spChg>
-        <pc:spChg chg="del mod">
-          <ac:chgData name="Treharne, Helen Prof (Computer Science)" userId="eac763e0-0bdd-4604-8d8c-433d2614a816" providerId="ADAL" clId="{D1783FE9-7518-4E61-9E3A-8AAED7D34DA1}" dt="2022-03-16T05:49:31.150" v="3979" actId="478"/>
-          <ac:spMkLst>
-            <pc:docMk/>
-            <pc:sldMk cId="1746192444" sldId="276"/>
-            <ac:spMk id="7" creationId="{5368EF6F-CAEB-4207-B7F1-FD3AA9DD132D}"/>
-          </ac:spMkLst>
-        </pc:spChg>
-        <pc:spChg chg="add mod">
-          <ac:chgData name="Treharne, Helen Prof (Computer Science)" userId="eac763e0-0bdd-4604-8d8c-433d2614a816" providerId="ADAL" clId="{D1783FE9-7518-4E61-9E3A-8AAED7D34DA1}" dt="2022-03-16T05:49:55.382" v="3984"/>
-          <ac:spMkLst>
-            <pc:docMk/>
-            <pc:sldMk cId="1746192444" sldId="276"/>
-            <ac:spMk id="8" creationId="{4CA93B19-3A7D-4C73-A649-C40F52F7BE06}"/>
-          </ac:spMkLst>
-        </pc:spChg>
-        <pc:spChg chg="add del mod">
-          <ac:chgData name="Treharne, Helen Prof (Computer Science)" userId="eac763e0-0bdd-4604-8d8c-433d2614a816" providerId="ADAL" clId="{D1783FE9-7518-4E61-9E3A-8AAED7D34DA1}" dt="2022-03-16T05:50:09.148" v="3985" actId="478"/>
-          <ac:spMkLst>
-            <pc:docMk/>
-            <pc:sldMk cId="1746192444" sldId="276"/>
-            <ac:spMk id="9" creationId="{02E3FF11-A1DD-4F35-8EB5-AC6609929D78}"/>
-          </ac:spMkLst>
-        </pc:spChg>
-        <pc:spChg chg="add del mod">
-          <ac:chgData name="Treharne, Helen Prof (Computer Science)" userId="eac763e0-0bdd-4604-8d8c-433d2614a816" providerId="ADAL" clId="{D1783FE9-7518-4E61-9E3A-8AAED7D34DA1}" dt="2022-03-16T05:50:09.148" v="3985" actId="478"/>
-          <ac:spMkLst>
-            <pc:docMk/>
-            <pc:sldMk cId="1746192444" sldId="276"/>
-            <ac:spMk id="10" creationId="{CD48C91B-95CC-49C1-B648-00BF6C75062E}"/>
-          </ac:spMkLst>
-        </pc:spChg>
-        <pc:spChg chg="add del mod">
-          <ac:chgData name="Treharne, Helen Prof (Computer Science)" userId="eac763e0-0bdd-4604-8d8c-433d2614a816" providerId="ADAL" clId="{D1783FE9-7518-4E61-9E3A-8AAED7D34DA1}" dt="2022-03-16T05:50:09.148" v="3985" actId="478"/>
-          <ac:spMkLst>
-            <pc:docMk/>
-            <pc:sldMk cId="1746192444" sldId="276"/>
-            <ac:spMk id="11" creationId="{B1F1F256-98C4-4DDE-AE5C-A6E81A03EDD9}"/>
-          </ac:spMkLst>
-        </pc:spChg>
-        <pc:spChg chg="add del mod">
-          <ac:chgData name="Treharne, Helen Prof (Computer Science)" userId="eac763e0-0bdd-4604-8d8c-433d2614a816" providerId="ADAL" clId="{D1783FE9-7518-4E61-9E3A-8AAED7D34DA1}" dt="2022-03-16T05:50:09.148" v="3985" actId="478"/>
-          <ac:spMkLst>
-            <pc:docMk/>
-            <pc:sldMk cId="1746192444" sldId="276"/>
-            <ac:spMk id="12" creationId="{50710F37-FAE1-4CE4-8BE1-58056F1DBA29}"/>
-          </ac:spMkLst>
-        </pc:spChg>
-        <pc:picChg chg="add mod">
-          <ac:chgData name="Treharne, Helen Prof (Computer Science)" userId="eac763e0-0bdd-4604-8d8c-433d2614a816" providerId="ADAL" clId="{D1783FE9-7518-4E61-9E3A-8AAED7D34DA1}" dt="2022-03-16T05:59:12.906" v="4144"/>
-          <ac:picMkLst>
-            <pc:docMk/>
-            <pc:sldMk cId="1746192444" sldId="276"/>
-            <ac:picMk id="13" creationId="{EABB2B15-7937-47BA-8D09-7B5CC01E5CC3}"/>
-          </ac:picMkLst>
-        </pc:picChg>
       </pc:sldChg>
-      <pc:sldChg chg="addSp delSp modSp mod modNotesTx">
-        <pc:chgData name="Treharne, Helen Prof (Computer Science)" userId="eac763e0-0bdd-4604-8d8c-433d2614a816" providerId="ADAL" clId="{D1783FE9-7518-4E61-9E3A-8AAED7D34DA1}" dt="2022-03-16T06:10:34.663" v="4282" actId="20577"/>
-        <pc:sldMkLst>
-          <pc:docMk/>
-          <pc:sldMk cId="604454818" sldId="277"/>
-        </pc:sldMkLst>
-        <pc:spChg chg="mod">
-          <ac:chgData name="Treharne, Helen Prof (Computer Science)" userId="eac763e0-0bdd-4604-8d8c-433d2614a816" providerId="ADAL" clId="{D1783FE9-7518-4E61-9E3A-8AAED7D34DA1}" dt="2022-03-16T05:45:06.589" v="3458" actId="20577"/>
-          <ac:spMkLst>
-            <pc:docMk/>
-            <pc:sldMk cId="604454818" sldId="277"/>
-            <ac:spMk id="3" creationId="{76F3A915-2D27-4B9C-8145-4EBF1A8E1B1D}"/>
-          </ac:spMkLst>
-        </pc:spChg>
-        <pc:spChg chg="del mod">
-          <ac:chgData name="Treharne, Helen Prof (Computer Science)" userId="eac763e0-0bdd-4604-8d8c-433d2614a816" providerId="ADAL" clId="{D1783FE9-7518-4E61-9E3A-8AAED7D34DA1}" dt="2022-03-16T05:49:35.438" v="3980" actId="478"/>
-          <ac:spMkLst>
-            <pc:docMk/>
-            <pc:sldMk cId="604454818" sldId="277"/>
-            <ac:spMk id="4" creationId="{AD642251-7EDC-49C1-B134-2FBE06606BC8}"/>
-          </ac:spMkLst>
-        </pc:spChg>
-        <pc:spChg chg="del mod">
-          <ac:chgData name="Treharne, Helen Prof (Computer Science)" userId="eac763e0-0bdd-4604-8d8c-433d2614a816" providerId="ADAL" clId="{D1783FE9-7518-4E61-9E3A-8AAED7D34DA1}" dt="2022-03-16T05:49:35.438" v="3980" actId="478"/>
-          <ac:spMkLst>
-            <pc:docMk/>
-            <pc:sldMk cId="604454818" sldId="277"/>
-            <ac:spMk id="7" creationId="{5368EF6F-CAEB-4207-B7F1-FD3AA9DD132D}"/>
-          </ac:spMkLst>
-        </pc:spChg>
-        <pc:spChg chg="del">
-          <ac:chgData name="Treharne, Helen Prof (Computer Science)" userId="eac763e0-0bdd-4604-8d8c-433d2614a816" providerId="ADAL" clId="{D1783FE9-7518-4E61-9E3A-8AAED7D34DA1}" dt="2022-03-16T05:49:35.438" v="3980" actId="478"/>
-          <ac:spMkLst>
-            <pc:docMk/>
-            <pc:sldMk cId="604454818" sldId="277"/>
-            <ac:spMk id="8" creationId="{99D53C85-4AE2-4C9E-88B4-82374B04FA07}"/>
-          </ac:spMkLst>
-        </pc:spChg>
-        <pc:spChg chg="add del mod">
-          <ac:chgData name="Treharne, Helen Prof (Computer Science)" userId="eac763e0-0bdd-4604-8d8c-433d2614a816" providerId="ADAL" clId="{D1783FE9-7518-4E61-9E3A-8AAED7D34DA1}" dt="2022-03-16T05:50:23.821" v="3989" actId="478"/>
-          <ac:spMkLst>
-            <pc:docMk/>
-            <pc:sldMk cId="604454818" sldId="277"/>
-            <ac:spMk id="9" creationId="{8C3D0998-0826-4A14-8251-5DD0C03099F7}"/>
-          </ac:spMkLst>
-        </pc:spChg>
-        <pc:spChg chg="add del mod">
-          <ac:chgData name="Treharne, Helen Prof (Computer Science)" userId="eac763e0-0bdd-4604-8d8c-433d2614a816" providerId="ADAL" clId="{D1783FE9-7518-4E61-9E3A-8AAED7D34DA1}" dt="2022-03-16T05:50:25.408" v="3990" actId="478"/>
-          <ac:spMkLst>
-            <pc:docMk/>
-            <pc:sldMk cId="604454818" sldId="277"/>
-            <ac:spMk id="10" creationId="{00927D09-688A-4784-876E-B67778D9B082}"/>
-          </ac:spMkLst>
-        </pc:spChg>
-        <pc:spChg chg="add mod">
-          <ac:chgData name="Treharne, Helen Prof (Computer Science)" userId="eac763e0-0bdd-4604-8d8c-433d2614a816" providerId="ADAL" clId="{D1783FE9-7518-4E61-9E3A-8AAED7D34DA1}" dt="2022-03-16T05:49:54.381" v="3983"/>
-          <ac:spMkLst>
-            <pc:docMk/>
-            <pc:sldMk cId="604454818" sldId="277"/>
-            <ac:spMk id="11" creationId="{91BE86D6-43B8-4024-8FE0-ABE14BDAB6CA}"/>
-          </ac:spMkLst>
-        </pc:spChg>
-        <pc:spChg chg="add mod">
-          <ac:chgData name="Treharne, Helen Prof (Computer Science)" userId="eac763e0-0bdd-4604-8d8c-433d2614a816" providerId="ADAL" clId="{D1783FE9-7518-4E61-9E3A-8AAED7D34DA1}" dt="2022-03-16T05:49:54.381" v="3983"/>
-          <ac:spMkLst>
-            <pc:docMk/>
-            <pc:sldMk cId="604454818" sldId="277"/>
-            <ac:spMk id="12" creationId="{2182E765-07B0-4562-9DFA-5322425ABFF6}"/>
-          </ac:spMkLst>
-        </pc:spChg>
-        <pc:spChg chg="add mod">
-          <ac:chgData name="Treharne, Helen Prof (Computer Science)" userId="eac763e0-0bdd-4604-8d8c-433d2614a816" providerId="ADAL" clId="{D1783FE9-7518-4E61-9E3A-8AAED7D34DA1}" dt="2022-03-16T05:49:54.381" v="3983"/>
-          <ac:spMkLst>
-            <pc:docMk/>
-            <pc:sldMk cId="604454818" sldId="277"/>
-            <ac:spMk id="13" creationId="{B36138BE-E844-4AE5-B83B-3541604D06BD}"/>
-          </ac:spMkLst>
-        </pc:spChg>
-        <pc:spChg chg="add del mod">
-          <ac:chgData name="Treharne, Helen Prof (Computer Science)" userId="eac763e0-0bdd-4604-8d8c-433d2614a816" providerId="ADAL" clId="{D1783FE9-7518-4E61-9E3A-8AAED7D34DA1}" dt="2022-03-16T05:50:20.917" v="3987" actId="478"/>
-          <ac:spMkLst>
-            <pc:docMk/>
-            <pc:sldMk cId="604454818" sldId="277"/>
-            <ac:spMk id="14" creationId="{48BA8EB3-B672-4A87-B980-9950C626BF05}"/>
-          </ac:spMkLst>
-        </pc:spChg>
-        <pc:spChg chg="add del mod">
-          <ac:chgData name="Treharne, Helen Prof (Computer Science)" userId="eac763e0-0bdd-4604-8d8c-433d2614a816" providerId="ADAL" clId="{D1783FE9-7518-4E61-9E3A-8AAED7D34DA1}" dt="2022-03-16T05:50:22.050" v="3988" actId="478"/>
-          <ac:spMkLst>
-            <pc:docMk/>
-            <pc:sldMk cId="604454818" sldId="277"/>
-            <ac:spMk id="15" creationId="{4DE72FFE-75DC-4127-9267-EBFE9F5EC013}"/>
-          </ac:spMkLst>
-        </pc:spChg>
-        <pc:picChg chg="add mod">
-          <ac:chgData name="Treharne, Helen Prof (Computer Science)" userId="eac763e0-0bdd-4604-8d8c-433d2614a816" providerId="ADAL" clId="{D1783FE9-7518-4E61-9E3A-8AAED7D34DA1}" dt="2022-03-16T05:59:14.679" v="4145"/>
-          <ac:picMkLst>
-            <pc:docMk/>
-            <pc:sldMk cId="604454818" sldId="277"/>
-            <ac:picMk id="16" creationId="{AA3552BA-F0F8-479C-8405-15B775E4E492}"/>
-          </ac:picMkLst>
-        </pc:picChg>
-      </pc:sldChg>
-      <pc:sldChg chg="addSp delSp modSp mod modNotesTx">
-        <pc:chgData name="Treharne, Helen Prof (Computer Science)" userId="eac763e0-0bdd-4604-8d8c-433d2614a816" providerId="ADAL" clId="{D1783FE9-7518-4E61-9E3A-8AAED7D34DA1}" dt="2022-03-16T05:59:16.034" v="4146"/>
-        <pc:sldMkLst>
-          <pc:docMk/>
-          <pc:sldMk cId="287479346" sldId="278"/>
-        </pc:sldMkLst>
-        <pc:spChg chg="mod">
-          <ac:chgData name="Treharne, Helen Prof (Computer Science)" userId="eac763e0-0bdd-4604-8d8c-433d2614a816" providerId="ADAL" clId="{D1783FE9-7518-4E61-9E3A-8AAED7D34DA1}" dt="2022-03-16T05:45:56.754" v="3666" actId="20577"/>
-          <ac:spMkLst>
-            <pc:docMk/>
-            <pc:sldMk cId="287479346" sldId="278"/>
-            <ac:spMk id="3" creationId="{76F3A915-2D27-4B9C-8145-4EBF1A8E1B1D}"/>
-          </ac:spMkLst>
-        </pc:spChg>
-        <pc:spChg chg="del">
-          <ac:chgData name="Treharne, Helen Prof (Computer Science)" userId="eac763e0-0bdd-4604-8d8c-433d2614a816" providerId="ADAL" clId="{D1783FE9-7518-4E61-9E3A-8AAED7D34DA1}" dt="2022-03-16T05:44:07.785" v="3393" actId="478"/>
-          <ac:spMkLst>
-            <pc:docMk/>
-            <pc:sldMk cId="287479346" sldId="278"/>
-            <ac:spMk id="4" creationId="{AD642251-7EDC-49C1-B134-2FBE06606BC8}"/>
-          </ac:spMkLst>
-        </pc:spChg>
-        <pc:spChg chg="del mod">
-          <ac:chgData name="Treharne, Helen Prof (Computer Science)" userId="eac763e0-0bdd-4604-8d8c-433d2614a816" providerId="ADAL" clId="{D1783FE9-7518-4E61-9E3A-8AAED7D34DA1}" dt="2022-03-16T05:49:39.731" v="3981" actId="478"/>
-          <ac:spMkLst>
-            <pc:docMk/>
-            <pc:sldMk cId="287479346" sldId="278"/>
-            <ac:spMk id="5" creationId="{D6D9DD30-D9CE-428A-B98F-540FAE176423}"/>
-          </ac:spMkLst>
-        </pc:spChg>
-        <pc:spChg chg="del">
-          <ac:chgData name="Treharne, Helen Prof (Computer Science)" userId="eac763e0-0bdd-4604-8d8c-433d2614a816" providerId="ADAL" clId="{D1783FE9-7518-4E61-9E3A-8AAED7D34DA1}" dt="2022-03-16T05:49:39.731" v="3981" actId="478"/>
-          <ac:spMkLst>
-            <pc:docMk/>
-            <pc:sldMk cId="287479346" sldId="278"/>
-            <ac:spMk id="6" creationId="{3FFD671A-057B-4069-BED8-3F426306EACA}"/>
-          </ac:spMkLst>
-        </pc:spChg>
-        <pc:spChg chg="del">
-          <ac:chgData name="Treharne, Helen Prof (Computer Science)" userId="eac763e0-0bdd-4604-8d8c-433d2614a816" providerId="ADAL" clId="{D1783FE9-7518-4E61-9E3A-8AAED7D34DA1}" dt="2022-03-16T05:49:39.731" v="3981" actId="478"/>
-          <ac:spMkLst>
-            <pc:docMk/>
-            <pc:sldMk cId="287479346" sldId="278"/>
-            <ac:spMk id="7" creationId="{5368EF6F-CAEB-4207-B7F1-FD3AA9DD132D}"/>
-          </ac:spMkLst>
-        </pc:spChg>
-        <pc:spChg chg="del">
-          <ac:chgData name="Treharne, Helen Prof (Computer Science)" userId="eac763e0-0bdd-4604-8d8c-433d2614a816" providerId="ADAL" clId="{D1783FE9-7518-4E61-9E3A-8AAED7D34DA1}" dt="2022-03-16T05:49:39.731" v="3981" actId="478"/>
-          <ac:spMkLst>
-            <pc:docMk/>
-            <pc:sldMk cId="287479346" sldId="278"/>
-            <ac:spMk id="8" creationId="{99D53C85-4AE2-4C9E-88B4-82374B04FA07}"/>
-          </ac:spMkLst>
-        </pc:spChg>
-        <pc:spChg chg="add del mod">
-          <ac:chgData name="Treharne, Helen Prof (Computer Science)" userId="eac763e0-0bdd-4604-8d8c-433d2614a816" providerId="ADAL" clId="{D1783FE9-7518-4E61-9E3A-8AAED7D34DA1}" dt="2022-03-16T05:49:39.731" v="3981" actId="478"/>
-          <ac:spMkLst>
-            <pc:docMk/>
-            <pc:sldMk cId="287479346" sldId="278"/>
-            <ac:spMk id="9" creationId="{F929000C-9EDA-4AA9-BA3E-07364912DB42}"/>
-          </ac:spMkLst>
-        </pc:spChg>
-        <pc:spChg chg="add del mod">
-          <ac:chgData name="Treharne, Helen Prof (Computer Science)" userId="eac763e0-0bdd-4604-8d8c-433d2614a816" providerId="ADAL" clId="{D1783FE9-7518-4E61-9E3A-8AAED7D34DA1}" dt="2022-03-16T05:46:20.201" v="3728"/>
-          <ac:spMkLst>
-            <pc:docMk/>
-            <pc:sldMk cId="287479346" sldId="278"/>
-            <ac:spMk id="10" creationId="{61891F59-7807-4BDF-ABF1-9CD6997C653A}"/>
-          </ac:spMkLst>
-        </pc:spChg>
-        <pc:spChg chg="add mod">
-          <ac:chgData name="Treharne, Helen Prof (Computer Science)" userId="eac763e0-0bdd-4604-8d8c-433d2614a816" providerId="ADAL" clId="{D1783FE9-7518-4E61-9E3A-8AAED7D34DA1}" dt="2022-03-16T05:49:52.778" v="3982"/>
-          <ac:spMkLst>
-            <pc:docMk/>
-            <pc:sldMk cId="287479346" sldId="278"/>
-            <ac:spMk id="11" creationId="{EA283C98-9110-4337-B1D2-13F0F55DE516}"/>
-          </ac:spMkLst>
-        </pc:spChg>
-        <pc:spChg chg="add mod">
-          <ac:chgData name="Treharne, Helen Prof (Computer Science)" userId="eac763e0-0bdd-4604-8d8c-433d2614a816" providerId="ADAL" clId="{D1783FE9-7518-4E61-9E3A-8AAED7D34DA1}" dt="2022-03-16T05:49:52.778" v="3982"/>
-          <ac:spMkLst>
-            <pc:docMk/>
-            <pc:sldMk cId="287479346" sldId="278"/>
-            <ac:spMk id="12" creationId="{B0EACA86-AA14-45E0-8873-B90E0B97ED5F}"/>
-          </ac:spMkLst>
-        </pc:spChg>
-        <pc:spChg chg="add mod">
-          <ac:chgData name="Treharne, Helen Prof (Computer Science)" userId="eac763e0-0bdd-4604-8d8c-433d2614a816" providerId="ADAL" clId="{D1783FE9-7518-4E61-9E3A-8AAED7D34DA1}" dt="2022-03-16T05:49:52.778" v="3982"/>
-          <ac:spMkLst>
-            <pc:docMk/>
-            <pc:sldMk cId="287479346" sldId="278"/>
-            <ac:spMk id="13" creationId="{598DAB6F-FDC7-4C55-95E5-BA6AFC45A1CA}"/>
-          </ac:spMkLst>
-        </pc:spChg>
-        <pc:spChg chg="add mod">
-          <ac:chgData name="Treharne, Helen Prof (Computer Science)" userId="eac763e0-0bdd-4604-8d8c-433d2614a816" providerId="ADAL" clId="{D1783FE9-7518-4E61-9E3A-8AAED7D34DA1}" dt="2022-03-16T05:49:52.778" v="3982"/>
-          <ac:spMkLst>
-            <pc:docMk/>
-            <pc:sldMk cId="287479346" sldId="278"/>
-            <ac:spMk id="14" creationId="{FC65390A-73B1-4E7E-8DD6-244EF0798953}"/>
-          </ac:spMkLst>
-        </pc:spChg>
-        <pc:spChg chg="add mod">
-          <ac:chgData name="Treharne, Helen Prof (Computer Science)" userId="eac763e0-0bdd-4604-8d8c-433d2614a816" providerId="ADAL" clId="{D1783FE9-7518-4E61-9E3A-8AAED7D34DA1}" dt="2022-03-16T05:49:52.778" v="3982"/>
-          <ac:spMkLst>
-            <pc:docMk/>
-            <pc:sldMk cId="287479346" sldId="278"/>
-            <ac:spMk id="15" creationId="{6325F46D-E04F-4372-8B5A-495E25DD5E8F}"/>
-          </ac:spMkLst>
-        </pc:spChg>
-        <pc:spChg chg="add del mod">
-          <ac:chgData name="Treharne, Helen Prof (Computer Science)" userId="eac763e0-0bdd-4604-8d8c-433d2614a816" providerId="ADAL" clId="{D1783FE9-7518-4E61-9E3A-8AAED7D34DA1}" dt="2022-03-16T05:50:37.878" v="3992" actId="478"/>
-          <ac:spMkLst>
-            <pc:docMk/>
-            <pc:sldMk cId="287479346" sldId="278"/>
-            <ac:spMk id="16" creationId="{AD75F5D3-B7FA-4BEE-A8E1-78C0C571070C}"/>
-          </ac:spMkLst>
-        </pc:spChg>
-        <pc:spChg chg="add del mod">
-          <ac:chgData name="Treharne, Helen Prof (Computer Science)" userId="eac763e0-0bdd-4604-8d8c-433d2614a816" providerId="ADAL" clId="{D1783FE9-7518-4E61-9E3A-8AAED7D34DA1}" dt="2022-03-16T05:50:36.344" v="3991" actId="478"/>
-          <ac:spMkLst>
-            <pc:docMk/>
-            <pc:sldMk cId="287479346" sldId="278"/>
-            <ac:spMk id="17" creationId="{D42C587A-33AE-42F3-8157-D35C79D825B2}"/>
-          </ac:spMkLst>
-        </pc:spChg>
-        <pc:picChg chg="add mod">
-          <ac:chgData name="Treharne, Helen Prof (Computer Science)" userId="eac763e0-0bdd-4604-8d8c-433d2614a816" providerId="ADAL" clId="{D1783FE9-7518-4E61-9E3A-8AAED7D34DA1}" dt="2022-03-16T05:59:16.034" v="4146"/>
-          <ac:picMkLst>
-            <pc:docMk/>
-            <pc:sldMk cId="287479346" sldId="278"/>
-            <ac:picMk id="18" creationId="{D6FF258D-1388-4A03-8CD4-003F57B7C382}"/>
-          </ac:picMkLst>
-        </pc:picChg>
-      </pc:sldChg>
-      <pc:sldChg chg="addSp delSp modSp add mod modNotesTx">
-        <pc:chgData name="Treharne, Helen Prof (Computer Science)" userId="eac763e0-0bdd-4604-8d8c-433d2614a816" providerId="ADAL" clId="{D1783FE9-7518-4E61-9E3A-8AAED7D34DA1}" dt="2022-03-16T05:34:17.477" v="2110" actId="20577"/>
-        <pc:sldMkLst>
-          <pc:docMk/>
-          <pc:sldMk cId="948300315" sldId="279"/>
-        </pc:sldMkLst>
-        <pc:spChg chg="mod">
-          <ac:chgData name="Treharne, Helen Prof (Computer Science)" userId="eac763e0-0bdd-4604-8d8c-433d2614a816" providerId="ADAL" clId="{D1783FE9-7518-4E61-9E3A-8AAED7D34DA1}" dt="2022-03-16T05:23:33.202" v="819" actId="5793"/>
-          <ac:spMkLst>
-            <pc:docMk/>
-            <pc:sldMk cId="948300315" sldId="279"/>
-            <ac:spMk id="3" creationId="{B6CCDA6D-FDC1-4E53-A9F8-C9046C5B02A8}"/>
-          </ac:spMkLst>
-        </pc:spChg>
-        <pc:spChg chg="mod">
-          <ac:chgData name="Treharne, Helen Prof (Computer Science)" userId="eac763e0-0bdd-4604-8d8c-433d2614a816" providerId="ADAL" clId="{D1783FE9-7518-4E61-9E3A-8AAED7D34DA1}" dt="2022-03-16T05:23:48.899" v="820" actId="1076"/>
-          <ac:spMkLst>
-            <pc:docMk/>
-            <pc:sldMk cId="948300315" sldId="279"/>
-            <ac:spMk id="5" creationId="{65AEFE92-4E85-425E-BBEA-152DEC762215}"/>
-          </ac:spMkLst>
-        </pc:spChg>
-        <pc:spChg chg="add del mod">
-          <ac:chgData name="Treharne, Helen Prof (Computer Science)" userId="eac763e0-0bdd-4604-8d8c-433d2614a816" providerId="ADAL" clId="{D1783FE9-7518-4E61-9E3A-8AAED7D34DA1}" dt="2022-03-16T05:24:08.839" v="829" actId="20577"/>
-          <ac:spMkLst>
-            <pc:docMk/>
-            <pc:sldMk cId="948300315" sldId="279"/>
-            <ac:spMk id="6" creationId="{5F5C1E44-138E-4901-A763-85E29AF79EE0}"/>
-          </ac:spMkLst>
-        </pc:spChg>
-        <pc:spChg chg="mod">
-          <ac:chgData name="Treharne, Helen Prof (Computer Science)" userId="eac763e0-0bdd-4604-8d8c-433d2614a816" providerId="ADAL" clId="{D1783FE9-7518-4E61-9E3A-8AAED7D34DA1}" dt="2022-03-16T05:23:57.335" v="822" actId="1076"/>
-          <ac:spMkLst>
-            <pc:docMk/>
-            <pc:sldMk cId="948300315" sldId="279"/>
-            <ac:spMk id="7" creationId="{FF1D22C1-9D56-4F71-A3C9-6FA5EE90B45F}"/>
-          </ac:spMkLst>
-        </pc:spChg>
-        <pc:spChg chg="del">
-          <ac:chgData name="Treharne, Helen Prof (Computer Science)" userId="eac763e0-0bdd-4604-8d8c-433d2614a816" providerId="ADAL" clId="{D1783FE9-7518-4E61-9E3A-8AAED7D34DA1}" dt="2022-03-16T05:23:16.616" v="814" actId="478"/>
-          <ac:spMkLst>
-            <pc:docMk/>
-            <pc:sldMk cId="948300315" sldId="279"/>
-            <ac:spMk id="8" creationId="{649AB1B9-7AE4-49C7-A977-7A5185F5A337}"/>
-          </ac:spMkLst>
-        </pc:spChg>
-        <pc:spChg chg="del">
-          <ac:chgData name="Treharne, Helen Prof (Computer Science)" userId="eac763e0-0bdd-4604-8d8c-433d2614a816" providerId="ADAL" clId="{D1783FE9-7518-4E61-9E3A-8AAED7D34DA1}" dt="2022-03-16T05:23:16.616" v="814" actId="478"/>
-          <ac:spMkLst>
-            <pc:docMk/>
-            <pc:sldMk cId="948300315" sldId="279"/>
-            <ac:spMk id="9" creationId="{F643EAEC-A1CA-481D-90AF-65FEE80CB1A4}"/>
-          </ac:spMkLst>
-        </pc:spChg>
-        <pc:spChg chg="del">
-          <ac:chgData name="Treharne, Helen Prof (Computer Science)" userId="eac763e0-0bdd-4604-8d8c-433d2614a816" providerId="ADAL" clId="{D1783FE9-7518-4E61-9E3A-8AAED7D34DA1}" dt="2022-03-16T05:23:16.616" v="814" actId="478"/>
-          <ac:spMkLst>
-            <pc:docMk/>
-            <pc:sldMk cId="948300315" sldId="279"/>
-            <ac:spMk id="10" creationId="{50DB89E0-67FA-49B5-A2F0-CF8D1E6D8AFB}"/>
-          </ac:spMkLst>
-        </pc:spChg>
-        <pc:spChg chg="del">
-          <ac:chgData name="Treharne, Helen Prof (Computer Science)" userId="eac763e0-0bdd-4604-8d8c-433d2614a816" providerId="ADAL" clId="{D1783FE9-7518-4E61-9E3A-8AAED7D34DA1}" dt="2022-03-16T05:23:25.736" v="816" actId="478"/>
-          <ac:spMkLst>
-            <pc:docMk/>
-            <pc:sldMk cId="948300315" sldId="279"/>
-            <ac:spMk id="11" creationId="{5F1DC435-5AE4-4667-B45A-6BB2D09B3B95}"/>
-          </ac:spMkLst>
-        </pc:spChg>
-        <pc:spChg chg="del">
-          <ac:chgData name="Treharne, Helen Prof (Computer Science)" userId="eac763e0-0bdd-4604-8d8c-433d2614a816" providerId="ADAL" clId="{D1783FE9-7518-4E61-9E3A-8AAED7D34DA1}" dt="2022-03-16T05:23:23.152" v="815" actId="478"/>
-          <ac:spMkLst>
-            <pc:docMk/>
-            <pc:sldMk cId="948300315" sldId="279"/>
-            <ac:spMk id="17" creationId="{BBFC95F7-BCFB-460C-BB50-FE0E35334238}"/>
-          </ac:spMkLst>
-        </pc:spChg>
-        <pc:cxnChg chg="del">
-          <ac:chgData name="Treharne, Helen Prof (Computer Science)" userId="eac763e0-0bdd-4604-8d8c-433d2614a816" providerId="ADAL" clId="{D1783FE9-7518-4E61-9E3A-8AAED7D34DA1}" dt="2022-03-16T05:23:11.477" v="812" actId="478"/>
-          <ac:cxnSpMkLst>
-            <pc:docMk/>
-            <pc:sldMk cId="948300315" sldId="279"/>
-            <ac:cxnSpMk id="14" creationId="{FA28A3EE-21A6-4B8D-82EC-42B5DE9CA74D}"/>
-          </ac:cxnSpMkLst>
-        </pc:cxnChg>
-        <pc:cxnChg chg="del">
-          <ac:chgData name="Treharne, Helen Prof (Computer Science)" userId="eac763e0-0bdd-4604-8d8c-433d2614a816" providerId="ADAL" clId="{D1783FE9-7518-4E61-9E3A-8AAED7D34DA1}" dt="2022-03-16T05:23:13.100" v="813" actId="478"/>
-          <ac:cxnSpMkLst>
-            <pc:docMk/>
-            <pc:sldMk cId="948300315" sldId="279"/>
-            <ac:cxnSpMk id="15" creationId="{223819D2-AC2B-4BB6-BB6B-F365FF47E082}"/>
-          </ac:cxnSpMkLst>
-        </pc:cxnChg>
-      </pc:sldChg>
-      <pc:sldChg chg="add del">
-        <pc:chgData name="Treharne, Helen Prof (Computer Science)" userId="eac763e0-0bdd-4604-8d8c-433d2614a816" providerId="ADAL" clId="{D1783FE9-7518-4E61-9E3A-8AAED7D34DA1}" dt="2022-03-16T05:35:34.498" v="2297" actId="47"/>
-        <pc:sldMkLst>
-          <pc:docMk/>
-          <pc:sldMk cId="1147344740" sldId="280"/>
-        </pc:sldMkLst>
-      </pc:sldChg>
-      <pc:sldChg chg="addSp delSp modSp add mod modNotesTx">
-        <pc:chgData name="Treharne, Helen Prof (Computer Science)" userId="eac763e0-0bdd-4604-8d8c-433d2614a816" providerId="ADAL" clId="{D1783FE9-7518-4E61-9E3A-8AAED7D34DA1}" dt="2022-03-16T05:30:51.884" v="1415" actId="20577"/>
-        <pc:sldMkLst>
-          <pc:docMk/>
-          <pc:sldMk cId="1124045469" sldId="281"/>
-        </pc:sldMkLst>
-        <pc:spChg chg="mod">
-          <ac:chgData name="Treharne, Helen Prof (Computer Science)" userId="eac763e0-0bdd-4604-8d8c-433d2614a816" providerId="ADAL" clId="{D1783FE9-7518-4E61-9E3A-8AAED7D34DA1}" dt="2022-03-16T05:25:08.728" v="846" actId="27636"/>
-          <ac:spMkLst>
-            <pc:docMk/>
-            <pc:sldMk cId="1124045469" sldId="281"/>
-            <ac:spMk id="3" creationId="{B6CCDA6D-FDC1-4E53-A9F8-C9046C5B02A8}"/>
-          </ac:spMkLst>
-        </pc:spChg>
-        <pc:spChg chg="del">
-          <ac:chgData name="Treharne, Helen Prof (Computer Science)" userId="eac763e0-0bdd-4604-8d8c-433d2614a816" providerId="ADAL" clId="{D1783FE9-7518-4E61-9E3A-8AAED7D34DA1}" dt="2022-03-16T05:24:55.800" v="841" actId="478"/>
-          <ac:spMkLst>
-            <pc:docMk/>
-            <pc:sldMk cId="1124045469" sldId="281"/>
-            <ac:spMk id="5" creationId="{65AEFE92-4E85-425E-BBEA-152DEC762215}"/>
-          </ac:spMkLst>
-        </pc:spChg>
-        <pc:spChg chg="del">
-          <ac:chgData name="Treharne, Helen Prof (Computer Science)" userId="eac763e0-0bdd-4604-8d8c-433d2614a816" providerId="ADAL" clId="{D1783FE9-7518-4E61-9E3A-8AAED7D34DA1}" dt="2022-03-16T05:24:53.311" v="840" actId="478"/>
-          <ac:spMkLst>
-            <pc:docMk/>
-            <pc:sldMk cId="1124045469" sldId="281"/>
-            <ac:spMk id="6" creationId="{5F5C1E44-138E-4901-A763-85E29AF79EE0}"/>
-          </ac:spMkLst>
-        </pc:spChg>
-        <pc:spChg chg="del">
-          <ac:chgData name="Treharne, Helen Prof (Computer Science)" userId="eac763e0-0bdd-4604-8d8c-433d2614a816" providerId="ADAL" clId="{D1783FE9-7518-4E61-9E3A-8AAED7D34DA1}" dt="2022-03-16T05:24:51.634" v="839" actId="478"/>
-          <ac:spMkLst>
-            <pc:docMk/>
-            <pc:sldMk cId="1124045469" sldId="281"/>
-            <ac:spMk id="7" creationId="{FF1D22C1-9D56-4F71-A3C9-6FA5EE90B45F}"/>
-          </ac:spMkLst>
-        </pc:spChg>
-        <pc:spChg chg="del mod">
-          <ac:chgData name="Treharne, Helen Prof (Computer Science)" userId="eac763e0-0bdd-4604-8d8c-433d2614a816" providerId="ADAL" clId="{D1783FE9-7518-4E61-9E3A-8AAED7D34DA1}" dt="2022-03-16T05:24:44.107" v="836" actId="478"/>
-          <ac:spMkLst>
-            <pc:docMk/>
-            <pc:sldMk cId="1124045469" sldId="281"/>
-            <ac:spMk id="8" creationId="{649AB1B9-7AE4-49C7-A977-7A5185F5A337}"/>
-          </ac:spMkLst>
-        </pc:spChg>
-        <pc:spChg chg="del">
-          <ac:chgData name="Treharne, Helen Prof (Computer Science)" userId="eac763e0-0bdd-4604-8d8c-433d2614a816" providerId="ADAL" clId="{D1783FE9-7518-4E61-9E3A-8AAED7D34DA1}" dt="2022-03-16T05:24:39.363" v="833" actId="478"/>
-          <ac:spMkLst>
-            <pc:docMk/>
-            <pc:sldMk cId="1124045469" sldId="281"/>
-            <ac:spMk id="9" creationId="{F643EAEC-A1CA-481D-90AF-65FEE80CB1A4}"/>
-          </ac:spMkLst>
-        </pc:spChg>
-        <pc:spChg chg="del">
-          <ac:chgData name="Treharne, Helen Prof (Computer Science)" userId="eac763e0-0bdd-4604-8d8c-433d2614a816" providerId="ADAL" clId="{D1783FE9-7518-4E61-9E3A-8AAED7D34DA1}" dt="2022-03-16T05:24:47.914" v="838" actId="478"/>
-          <ac:spMkLst>
-            <pc:docMk/>
-            <pc:sldMk cId="1124045469" sldId="281"/>
-            <ac:spMk id="10" creationId="{50DB89E0-67FA-49B5-A2F0-CF8D1E6D8AFB}"/>
-          </ac:spMkLst>
-        </pc:spChg>
-        <pc:spChg chg="del mod">
-          <ac:chgData name="Treharne, Helen Prof (Computer Science)" userId="eac763e0-0bdd-4604-8d8c-433d2614a816" providerId="ADAL" clId="{D1783FE9-7518-4E61-9E3A-8AAED7D34DA1}" dt="2022-03-16T05:25:05.451" v="844" actId="478"/>
-          <ac:spMkLst>
-            <pc:docMk/>
-            <pc:sldMk cId="1124045469" sldId="281"/>
-            <ac:spMk id="11" creationId="{5F1DC435-5AE4-4667-B45A-6BB2D09B3B95}"/>
-          </ac:spMkLst>
-        </pc:spChg>
-        <pc:spChg chg="add mod">
-          <ac:chgData name="Treharne, Helen Prof (Computer Science)" userId="eac763e0-0bdd-4604-8d8c-433d2614a816" providerId="ADAL" clId="{D1783FE9-7518-4E61-9E3A-8AAED7D34DA1}" dt="2022-03-16T05:28:49.557" v="1100" actId="20577"/>
-          <ac:spMkLst>
-            <pc:docMk/>
-            <pc:sldMk cId="1124045469" sldId="281"/>
-            <ac:spMk id="16" creationId="{7B2C56CC-AE3D-4713-B0C2-020DB2850924}"/>
-          </ac:spMkLst>
-        </pc:spChg>
-        <pc:spChg chg="mod">
-          <ac:chgData name="Treharne, Helen Prof (Computer Science)" userId="eac763e0-0bdd-4604-8d8c-433d2614a816" providerId="ADAL" clId="{D1783FE9-7518-4E61-9E3A-8AAED7D34DA1}" dt="2022-03-16T05:28:56.140" v="1104" actId="20577"/>
-          <ac:spMkLst>
-            <pc:docMk/>
-            <pc:sldMk cId="1124045469" sldId="281"/>
-            <ac:spMk id="17" creationId="{BBFC95F7-BCFB-460C-BB50-FE0E35334238}"/>
-          </ac:spMkLst>
-        </pc:spChg>
-        <pc:cxnChg chg="del">
-          <ac:chgData name="Treharne, Helen Prof (Computer Science)" userId="eac763e0-0bdd-4604-8d8c-433d2614a816" providerId="ADAL" clId="{D1783FE9-7518-4E61-9E3A-8AAED7D34DA1}" dt="2022-03-16T05:24:40.509" v="834" actId="478"/>
-          <ac:cxnSpMkLst>
-            <pc:docMk/>
-            <pc:sldMk cId="1124045469" sldId="281"/>
-            <ac:cxnSpMk id="14" creationId="{FA28A3EE-21A6-4B8D-82EC-42B5DE9CA74D}"/>
-          </ac:cxnSpMkLst>
-        </pc:cxnChg>
-        <pc:cxnChg chg="del">
-          <ac:chgData name="Treharne, Helen Prof (Computer Science)" userId="eac763e0-0bdd-4604-8d8c-433d2614a816" providerId="ADAL" clId="{D1783FE9-7518-4E61-9E3A-8AAED7D34DA1}" dt="2022-03-16T05:24:45.514" v="837" actId="478"/>
-          <ac:cxnSpMkLst>
-            <pc:docMk/>
-            <pc:sldMk cId="1124045469" sldId="281"/>
-            <ac:cxnSpMk id="15" creationId="{223819D2-AC2B-4BB6-BB6B-F365FF47E082}"/>
-          </ac:cxnSpMkLst>
-        </pc:cxnChg>
-      </pc:sldChg>
-      <pc:sldChg chg="delSp modSp add mod modNotesTx">
-        <pc:chgData name="Treharne, Helen Prof (Computer Science)" userId="eac763e0-0bdd-4604-8d8c-433d2614a816" providerId="ADAL" clId="{D1783FE9-7518-4E61-9E3A-8AAED7D34DA1}" dt="2022-03-16T05:35:17.156" v="2296" actId="20577"/>
+      <pc:sldChg chg="modSp mod">
+        <pc:chgData name="Treharne, Helen Prof (Computer Science)" userId="eac763e0-0bdd-4604-8d8c-433d2614a816" providerId="ADAL" clId="{BE809B97-A1F8-473E-87A0-864E94C72BD5}" dt="2022-03-21T14:47:02.237" v="16" actId="20577"/>
         <pc:sldMkLst>
           <pc:docMk/>
           <pc:sldMk cId="1012099398" sldId="282"/>
         </pc:sldMkLst>
         <pc:spChg chg="mod">
-          <ac:chgData name="Treharne, Helen Prof (Computer Science)" userId="eac763e0-0bdd-4604-8d8c-433d2614a816" providerId="ADAL" clId="{D1783FE9-7518-4E61-9E3A-8AAED7D34DA1}" dt="2022-03-16T05:31:27.407" v="1531" actId="15"/>
+          <ac:chgData name="Treharne, Helen Prof (Computer Science)" userId="eac763e0-0bdd-4604-8d8c-433d2614a816" providerId="ADAL" clId="{BE809B97-A1F8-473E-87A0-864E94C72BD5}" dt="2022-03-21T14:47:02.237" v="16" actId="20577"/>
           <ac:spMkLst>
             <pc:docMk/>
             <pc:sldMk cId="1012099398" sldId="282"/>
             <ac:spMk id="3" creationId="{B6CCDA6D-FDC1-4E53-A9F8-C9046C5B02A8}"/>
           </ac:spMkLst>
         </pc:spChg>
-        <pc:spChg chg="del mod">
-          <ac:chgData name="Treharne, Helen Prof (Computer Science)" userId="eac763e0-0bdd-4604-8d8c-433d2614a816" providerId="ADAL" clId="{D1783FE9-7518-4E61-9E3A-8AAED7D34DA1}" dt="2022-03-16T05:28:21.806" v="1072" actId="478"/>
-          <ac:spMkLst>
-            <pc:docMk/>
-            <pc:sldMk cId="1012099398" sldId="282"/>
-            <ac:spMk id="5" creationId="{65AEFE92-4E85-425E-BBEA-152DEC762215}"/>
-          </ac:spMkLst>
-        </pc:spChg>
-        <pc:spChg chg="del">
-          <ac:chgData name="Treharne, Helen Prof (Computer Science)" userId="eac763e0-0bdd-4604-8d8c-433d2614a816" providerId="ADAL" clId="{D1783FE9-7518-4E61-9E3A-8AAED7D34DA1}" dt="2022-03-16T05:28:16.415" v="1070" actId="478"/>
-          <ac:spMkLst>
-            <pc:docMk/>
-            <pc:sldMk cId="1012099398" sldId="282"/>
-            <ac:spMk id="6" creationId="{5F5C1E44-138E-4901-A763-85E29AF79EE0}"/>
-          </ac:spMkLst>
-        </pc:spChg>
-        <pc:spChg chg="del">
-          <ac:chgData name="Treharne, Helen Prof (Computer Science)" userId="eac763e0-0bdd-4604-8d8c-433d2614a816" providerId="ADAL" clId="{D1783FE9-7518-4E61-9E3A-8AAED7D34DA1}" dt="2022-03-16T05:28:14.031" v="1069" actId="478"/>
-          <ac:spMkLst>
-            <pc:docMk/>
-            <pc:sldMk cId="1012099398" sldId="282"/>
-            <ac:spMk id="7" creationId="{FF1D22C1-9D56-4F71-A3C9-6FA5EE90B45F}"/>
-          </ac:spMkLst>
-        </pc:spChg>
-        <pc:spChg chg="del mod">
-          <ac:chgData name="Treharne, Helen Prof (Computer Science)" userId="eac763e0-0bdd-4604-8d8c-433d2614a816" providerId="ADAL" clId="{D1783FE9-7518-4E61-9E3A-8AAED7D34DA1}" dt="2022-03-16T05:28:00.435" v="1066" actId="478"/>
-          <ac:spMkLst>
-            <pc:docMk/>
-            <pc:sldMk cId="1012099398" sldId="282"/>
-            <ac:spMk id="8" creationId="{649AB1B9-7AE4-49C7-A977-7A5185F5A337}"/>
-          </ac:spMkLst>
-        </pc:spChg>
-        <pc:spChg chg="del mod">
-          <ac:chgData name="Treharne, Helen Prof (Computer Science)" userId="eac763e0-0bdd-4604-8d8c-433d2614a816" providerId="ADAL" clId="{D1783FE9-7518-4E61-9E3A-8AAED7D34DA1}" dt="2022-03-16T05:27:55.815" v="1064" actId="478"/>
-          <ac:spMkLst>
-            <pc:docMk/>
-            <pc:sldMk cId="1012099398" sldId="282"/>
-            <ac:spMk id="9" creationId="{F643EAEC-A1CA-481D-90AF-65FEE80CB1A4}"/>
-          </ac:spMkLst>
-        </pc:spChg>
-        <pc:spChg chg="del">
-          <ac:chgData name="Treharne, Helen Prof (Computer Science)" userId="eac763e0-0bdd-4604-8d8c-433d2614a816" providerId="ADAL" clId="{D1783FE9-7518-4E61-9E3A-8AAED7D34DA1}" dt="2022-03-16T05:28:02.497" v="1067" actId="478"/>
-          <ac:spMkLst>
-            <pc:docMk/>
-            <pc:sldMk cId="1012099398" sldId="282"/>
-            <ac:spMk id="10" creationId="{50DB89E0-67FA-49B5-A2F0-CF8D1E6D8AFB}"/>
-          </ac:spMkLst>
-        </pc:spChg>
-        <pc:spChg chg="del">
-          <ac:chgData name="Treharne, Helen Prof (Computer Science)" userId="eac763e0-0bdd-4604-8d8c-433d2614a816" providerId="ADAL" clId="{D1783FE9-7518-4E61-9E3A-8AAED7D34DA1}" dt="2022-03-16T05:28:27.239" v="1074" actId="21"/>
-          <ac:spMkLst>
-            <pc:docMk/>
-            <pc:sldMk cId="1012099398" sldId="282"/>
-            <ac:spMk id="11" creationId="{5F1DC435-5AE4-4667-B45A-6BB2D09B3B95}"/>
-          </ac:spMkLst>
-        </pc:spChg>
-        <pc:spChg chg="del">
-          <ac:chgData name="Treharne, Helen Prof (Computer Science)" userId="eac763e0-0bdd-4604-8d8c-433d2614a816" providerId="ADAL" clId="{D1783FE9-7518-4E61-9E3A-8AAED7D34DA1}" dt="2022-03-16T05:28:23.409" v="1073" actId="478"/>
-          <ac:spMkLst>
-            <pc:docMk/>
-            <pc:sldMk cId="1012099398" sldId="282"/>
-            <ac:spMk id="17" creationId="{BBFC95F7-BCFB-460C-BB50-FE0E35334238}"/>
-          </ac:spMkLst>
-        </pc:spChg>
-        <pc:cxnChg chg="del">
-          <ac:chgData name="Treharne, Helen Prof (Computer Science)" userId="eac763e0-0bdd-4604-8d8c-433d2614a816" providerId="ADAL" clId="{D1783FE9-7518-4E61-9E3A-8AAED7D34DA1}" dt="2022-03-16T05:27:41.916" v="1062" actId="478"/>
-          <ac:cxnSpMkLst>
-            <pc:docMk/>
-            <pc:sldMk cId="1012099398" sldId="282"/>
-            <ac:cxnSpMk id="14" creationId="{FA28A3EE-21A6-4B8D-82EC-42B5DE9CA74D}"/>
-          </ac:cxnSpMkLst>
-        </pc:cxnChg>
-        <pc:cxnChg chg="del">
-          <ac:chgData name="Treharne, Helen Prof (Computer Science)" userId="eac763e0-0bdd-4604-8d8c-433d2614a816" providerId="ADAL" clId="{D1783FE9-7518-4E61-9E3A-8AAED7D34DA1}" dt="2022-03-16T05:28:10.259" v="1068" actId="478"/>
-          <ac:cxnSpMkLst>
-            <pc:docMk/>
-            <pc:sldMk cId="1012099398" sldId="282"/>
-            <ac:cxnSpMk id="15" creationId="{223819D2-AC2B-4BB6-BB6B-F365FF47E082}"/>
-          </ac:cxnSpMkLst>
-        </pc:cxnChg>
-      </pc:sldChg>
-      <pc:sldChg chg="addSp modSp add mod modNotesTx">
-        <pc:chgData name="Treharne, Helen Prof (Computer Science)" userId="eac763e0-0bdd-4604-8d8c-433d2614a816" providerId="ADAL" clId="{D1783FE9-7518-4E61-9E3A-8AAED7D34DA1}" dt="2022-03-16T06:13:31.237" v="4658" actId="20577"/>
-        <pc:sldMkLst>
-          <pc:docMk/>
-          <pc:sldMk cId="975813643" sldId="283"/>
-        </pc:sldMkLst>
-        <pc:spChg chg="mod">
-          <ac:chgData name="Treharne, Helen Prof (Computer Science)" userId="eac763e0-0bdd-4604-8d8c-433d2614a816" providerId="ADAL" clId="{D1783FE9-7518-4E61-9E3A-8AAED7D34DA1}" dt="2022-03-16T06:01:13.358" v="4246" actId="20577"/>
-          <ac:spMkLst>
-            <pc:docMk/>
-            <pc:sldMk cId="975813643" sldId="283"/>
-            <ac:spMk id="3" creationId="{76F3A915-2D27-4B9C-8145-4EBF1A8E1B1D}"/>
-          </ac:spMkLst>
-        </pc:spChg>
-        <pc:spChg chg="mod">
-          <ac:chgData name="Treharne, Helen Prof (Computer Science)" userId="eac763e0-0bdd-4604-8d8c-433d2614a816" providerId="ADAL" clId="{D1783FE9-7518-4E61-9E3A-8AAED7D34DA1}" dt="2022-03-16T05:47:32.062" v="3898" actId="1036"/>
-          <ac:spMkLst>
-            <pc:docMk/>
-            <pc:sldMk cId="975813643" sldId="283"/>
-            <ac:spMk id="5" creationId="{D6D9DD30-D9CE-428A-B98F-540FAE176423}"/>
-          </ac:spMkLst>
-        </pc:spChg>
-        <pc:spChg chg="mod">
-          <ac:chgData name="Treharne, Helen Prof (Computer Science)" userId="eac763e0-0bdd-4604-8d8c-433d2614a816" providerId="ADAL" clId="{D1783FE9-7518-4E61-9E3A-8AAED7D34DA1}" dt="2022-03-16T05:47:32.062" v="3898" actId="1036"/>
-          <ac:spMkLst>
-            <pc:docMk/>
-            <pc:sldMk cId="975813643" sldId="283"/>
-            <ac:spMk id="6" creationId="{3FFD671A-057B-4069-BED8-3F426306EACA}"/>
-          </ac:spMkLst>
-        </pc:spChg>
-        <pc:spChg chg="mod">
-          <ac:chgData name="Treharne, Helen Prof (Computer Science)" userId="eac763e0-0bdd-4604-8d8c-433d2614a816" providerId="ADAL" clId="{D1783FE9-7518-4E61-9E3A-8AAED7D34DA1}" dt="2022-03-16T05:47:32.062" v="3898" actId="1036"/>
-          <ac:spMkLst>
-            <pc:docMk/>
-            <pc:sldMk cId="975813643" sldId="283"/>
-            <ac:spMk id="7" creationId="{5368EF6F-CAEB-4207-B7F1-FD3AA9DD132D}"/>
-          </ac:spMkLst>
-        </pc:spChg>
-        <pc:spChg chg="mod">
-          <ac:chgData name="Treharne, Helen Prof (Computer Science)" userId="eac763e0-0bdd-4604-8d8c-433d2614a816" providerId="ADAL" clId="{D1783FE9-7518-4E61-9E3A-8AAED7D34DA1}" dt="2022-03-16T05:47:41.884" v="3901" actId="1038"/>
-          <ac:spMkLst>
-            <pc:docMk/>
-            <pc:sldMk cId="975813643" sldId="283"/>
-            <ac:spMk id="8" creationId="{99D53C85-4AE2-4C9E-88B4-82374B04FA07}"/>
-          </ac:spMkLst>
-        </pc:spChg>
-        <pc:spChg chg="mod">
-          <ac:chgData name="Treharne, Helen Prof (Computer Science)" userId="eac763e0-0bdd-4604-8d8c-433d2614a816" providerId="ADAL" clId="{D1783FE9-7518-4E61-9E3A-8AAED7D34DA1}" dt="2022-03-16T05:47:32.062" v="3898" actId="1036"/>
-          <ac:spMkLst>
-            <pc:docMk/>
-            <pc:sldMk cId="975813643" sldId="283"/>
-            <ac:spMk id="9" creationId="{F929000C-9EDA-4AA9-BA3E-07364912DB42}"/>
-          </ac:spMkLst>
-        </pc:spChg>
-        <pc:spChg chg="add mod">
-          <ac:chgData name="Treharne, Helen Prof (Computer Science)" userId="eac763e0-0bdd-4604-8d8c-433d2614a816" providerId="ADAL" clId="{D1783FE9-7518-4E61-9E3A-8AAED7D34DA1}" dt="2022-03-16T05:48:00.093" v="3909" actId="1037"/>
-          <ac:spMkLst>
-            <pc:docMk/>
-            <pc:sldMk cId="975813643" sldId="283"/>
-            <ac:spMk id="10" creationId="{2E4CBA40-115B-490B-A7C4-2EBD8D18F6D4}"/>
-          </ac:spMkLst>
-        </pc:spChg>
-        <pc:spChg chg="add mod">
-          <ac:chgData name="Treharne, Helen Prof (Computer Science)" userId="eac763e0-0bdd-4604-8d8c-433d2614a816" providerId="ADAL" clId="{D1783FE9-7518-4E61-9E3A-8AAED7D34DA1}" dt="2022-03-16T05:48:06.759" v="3911" actId="1076"/>
-          <ac:spMkLst>
-            <pc:docMk/>
-            <pc:sldMk cId="975813643" sldId="283"/>
-            <ac:spMk id="11" creationId="{33776226-2396-4D24-9BA8-B4EF33A75ABF}"/>
-          </ac:spMkLst>
-        </pc:spChg>
-        <pc:picChg chg="add mod">
-          <ac:chgData name="Treharne, Helen Prof (Computer Science)" userId="eac763e0-0bdd-4604-8d8c-433d2614a816" providerId="ADAL" clId="{D1783FE9-7518-4E61-9E3A-8AAED7D34DA1}" dt="2022-03-16T05:59:17.732" v="4147"/>
-          <ac:picMkLst>
-            <pc:docMk/>
-            <pc:sldMk cId="975813643" sldId="283"/>
-            <ac:picMk id="12" creationId="{FCC6CC09-4CC3-4C67-9002-B06F7BFDAB6A}"/>
-          </ac:picMkLst>
-        </pc:picChg>
-      </pc:sldChg>
-      <pc:sldChg chg="addSp delSp modSp add mod ord modNotesTx">
-        <pc:chgData name="Treharne, Helen Prof (Computer Science)" userId="eac763e0-0bdd-4604-8d8c-433d2614a816" providerId="ADAL" clId="{D1783FE9-7518-4E61-9E3A-8AAED7D34DA1}" dt="2022-03-16T06:00:30.021" v="4154" actId="14"/>
-        <pc:sldMkLst>
-          <pc:docMk/>
-          <pc:sldMk cId="11019421" sldId="284"/>
-        </pc:sldMkLst>
-        <pc:spChg chg="mod">
-          <ac:chgData name="Treharne, Helen Prof (Computer Science)" userId="eac763e0-0bdd-4604-8d8c-433d2614a816" providerId="ADAL" clId="{D1783FE9-7518-4E61-9E3A-8AAED7D34DA1}" dt="2022-03-16T06:00:30.021" v="4154" actId="14"/>
-          <ac:spMkLst>
-            <pc:docMk/>
-            <pc:sldMk cId="11019421" sldId="284"/>
-            <ac:spMk id="3" creationId="{B6CCDA6D-FDC1-4E53-A9F8-C9046C5B02A8}"/>
-          </ac:spMkLst>
-        </pc:spChg>
-        <pc:graphicFrameChg chg="mod modGraphic">
-          <ac:chgData name="Treharne, Helen Prof (Computer Science)" userId="eac763e0-0bdd-4604-8d8c-433d2614a816" providerId="ADAL" clId="{D1783FE9-7518-4E61-9E3A-8AAED7D34DA1}" dt="2022-03-16T05:59:42.126" v="4150" actId="1035"/>
-          <ac:graphicFrameMkLst>
-            <pc:docMk/>
-            <pc:sldMk cId="11019421" sldId="284"/>
-            <ac:graphicFrameMk id="8" creationId="{7E93C81A-139E-4983-A41A-221EB96311AA}"/>
-          </ac:graphicFrameMkLst>
-        </pc:graphicFrameChg>
-        <pc:picChg chg="del">
-          <ac:chgData name="Treharne, Helen Prof (Computer Science)" userId="eac763e0-0bdd-4604-8d8c-433d2614a816" providerId="ADAL" clId="{D1783FE9-7518-4E61-9E3A-8AAED7D34DA1}" dt="2022-03-16T05:58:54.896" v="4143" actId="478"/>
-          <ac:picMkLst>
-            <pc:docMk/>
-            <pc:sldMk cId="11019421" sldId="284"/>
-            <ac:picMk id="5" creationId="{5181113E-6509-4F9B-9663-EB8F8CACC9D9}"/>
-          </ac:picMkLst>
-        </pc:picChg>
-        <pc:picChg chg="add mod">
-          <ac:chgData name="Treharne, Helen Prof (Computer Science)" userId="eac763e0-0bdd-4604-8d8c-433d2614a816" providerId="ADAL" clId="{D1783FE9-7518-4E61-9E3A-8AAED7D34DA1}" dt="2022-03-16T05:59:22.944" v="4148"/>
-          <ac:picMkLst>
-            <pc:docMk/>
-            <pc:sldMk cId="11019421" sldId="284"/>
-            <ac:picMk id="7" creationId="{1C4E5BE7-539C-4314-84F4-6A9894B53859}"/>
-          </ac:picMkLst>
-        </pc:picChg>
       </pc:sldChg>
     </pc:docChg>
   </pc:docChgLst>
@@ -1224,7 +277,7 @@
           <a:p>
             <a:fld id="{6AA3406A-3C57-4782-9726-1AE9A655C6CB}" type="datetimeFigureOut">
               <a:rPr lang="en-GB" smtClean="0"/>
-              <a:t>16/03/2022</a:t>
+              <a:t>21/03/2022</a:t>
             </a:fld>
             <a:endParaRPr lang="en-GB"/>
           </a:p>
@@ -3094,8 +2147,13 @@
           <a:p>
             <a:r>
               <a:rPr lang="en-GB" dirty="0"/>
-              <a:t>Now let us complete this first lesson to learn patterns of how to create strong passwords.</a:t>
-            </a:r>
+              <a:t>Now let us complete this first lesson to learn patterns of how to create strong passwords</a:t>
+            </a:r>
+            <a:r>
+              <a:rPr lang="en-GB"/>
+              <a:t>. </a:t>
+            </a:r>
+            <a:endParaRPr lang="en-GB" dirty="0"/>
           </a:p>
           <a:p>
             <a:endParaRPr lang="en-GB" dirty="0"/>
@@ -3516,7 +2574,7 @@
           <a:p>
             <a:fld id="{181B0B18-2B2A-45F4-803F-6AF068BBBC74}" type="datetimeFigureOut">
               <a:rPr lang="en-GB" smtClean="0"/>
-              <a:t>16/03/2022</a:t>
+              <a:t>21/03/2022</a:t>
             </a:fld>
             <a:endParaRPr lang="en-GB"/>
           </a:p>
@@ -3716,7 +2774,7 @@
           <a:p>
             <a:fld id="{181B0B18-2B2A-45F4-803F-6AF068BBBC74}" type="datetimeFigureOut">
               <a:rPr lang="en-GB" smtClean="0"/>
-              <a:t>16/03/2022</a:t>
+              <a:t>21/03/2022</a:t>
             </a:fld>
             <a:endParaRPr lang="en-GB"/>
           </a:p>
@@ -3926,7 +2984,7 @@
           <a:p>
             <a:fld id="{181B0B18-2B2A-45F4-803F-6AF068BBBC74}" type="datetimeFigureOut">
               <a:rPr lang="en-GB" smtClean="0"/>
-              <a:t>16/03/2022</a:t>
+              <a:t>21/03/2022</a:t>
             </a:fld>
             <a:endParaRPr lang="en-GB"/>
           </a:p>
@@ -4126,7 +3184,7 @@
           <a:p>
             <a:fld id="{181B0B18-2B2A-45F4-803F-6AF068BBBC74}" type="datetimeFigureOut">
               <a:rPr lang="en-GB" smtClean="0"/>
-              <a:t>16/03/2022</a:t>
+              <a:t>21/03/2022</a:t>
             </a:fld>
             <a:endParaRPr lang="en-GB"/>
           </a:p>
@@ -4402,7 +3460,7 @@
           <a:p>
             <a:fld id="{181B0B18-2B2A-45F4-803F-6AF068BBBC74}" type="datetimeFigureOut">
               <a:rPr lang="en-GB" smtClean="0"/>
-              <a:t>16/03/2022</a:t>
+              <a:t>21/03/2022</a:t>
             </a:fld>
             <a:endParaRPr lang="en-GB"/>
           </a:p>
@@ -4670,7 +3728,7 @@
           <a:p>
             <a:fld id="{181B0B18-2B2A-45F4-803F-6AF068BBBC74}" type="datetimeFigureOut">
               <a:rPr lang="en-GB" smtClean="0"/>
-              <a:t>16/03/2022</a:t>
+              <a:t>21/03/2022</a:t>
             </a:fld>
             <a:endParaRPr lang="en-GB"/>
           </a:p>
@@ -5085,7 +4143,7 @@
           <a:p>
             <a:fld id="{181B0B18-2B2A-45F4-803F-6AF068BBBC74}" type="datetimeFigureOut">
               <a:rPr lang="en-GB" smtClean="0"/>
-              <a:t>16/03/2022</a:t>
+              <a:t>21/03/2022</a:t>
             </a:fld>
             <a:endParaRPr lang="en-GB"/>
           </a:p>
@@ -5227,7 +4285,7 @@
           <a:p>
             <a:fld id="{181B0B18-2B2A-45F4-803F-6AF068BBBC74}" type="datetimeFigureOut">
               <a:rPr lang="en-GB" smtClean="0"/>
-              <a:t>16/03/2022</a:t>
+              <a:t>21/03/2022</a:t>
             </a:fld>
             <a:endParaRPr lang="en-GB"/>
           </a:p>
@@ -5340,7 +4398,7 @@
           <a:p>
             <a:fld id="{181B0B18-2B2A-45F4-803F-6AF068BBBC74}" type="datetimeFigureOut">
               <a:rPr lang="en-GB" smtClean="0"/>
-              <a:t>16/03/2022</a:t>
+              <a:t>21/03/2022</a:t>
             </a:fld>
             <a:endParaRPr lang="en-GB"/>
           </a:p>
@@ -5653,7 +4711,7 @@
           <a:p>
             <a:fld id="{181B0B18-2B2A-45F4-803F-6AF068BBBC74}" type="datetimeFigureOut">
               <a:rPr lang="en-GB" smtClean="0"/>
-              <a:t>16/03/2022</a:t>
+              <a:t>21/03/2022</a:t>
             </a:fld>
             <a:endParaRPr lang="en-GB"/>
           </a:p>
@@ -5942,7 +5000,7 @@
           <a:p>
             <a:fld id="{181B0B18-2B2A-45F4-803F-6AF068BBBC74}" type="datetimeFigureOut">
               <a:rPr lang="en-GB" smtClean="0"/>
-              <a:t>16/03/2022</a:t>
+              <a:t>21/03/2022</a:t>
             </a:fld>
             <a:endParaRPr lang="en-GB"/>
           </a:p>
@@ -6185,7 +5243,7 @@
           <a:p>
             <a:fld id="{181B0B18-2B2A-45F4-803F-6AF068BBBC74}" type="datetimeFigureOut">
               <a:rPr lang="en-GB" smtClean="0"/>
-              <a:t>16/03/2022</a:t>
+              <a:t>21/03/2022</a:t>
             </a:fld>
             <a:endParaRPr lang="en-GB"/>
           </a:p>
@@ -7061,7 +6119,7 @@
           <a:p>
             <a:r>
               <a:rPr lang="en-GB" dirty="0"/>
-              <a:t>Do not user the website name in the password</a:t>
+              <a:t>Do not use the website name in the password</a:t>
             </a:r>
           </a:p>
           <a:p>
@@ -7221,8 +6279,12 @@
           <a:lstStyle/>
           <a:p>
             <a:r>
+              <a:rPr lang="en-GB"/>
+              <a:t>Choose a </a:t>
+            </a:r>
+            <a:r>
               <a:rPr lang="en-GB" dirty="0"/>
-              <a:t>Choose 3 a three random word password</a:t>
+              <a:t>three random word password</a:t>
             </a:r>
           </a:p>
           <a:p>
@@ -10890,7 +9952,7 @@
           <a:p>
             <a:r>
               <a:rPr lang="en-GB" dirty="0"/>
-              <a:t>Have your confidence in knowing  how to choose a strong password using words increased?</a:t>
+              <a:t>Have your confidence in knowing how to choose a strong password using words increased?</a:t>
             </a:r>
           </a:p>
           <a:p>
@@ -11536,25 +10598,6 @@
                   </a:spcAft>
                   <a:buNone/>
                 </a:pPr>
-                <a:endParaRPr lang="en-GB" sz="1500" kern="1200" dirty="0">
-                  <a:solidFill>
-                    <a:schemeClr val="tx1"/>
-                  </a:solidFill>
-                </a:endParaRPr>
-              </a:p>
-              <a:p>
-                <a:pPr marL="0" lvl="0" indent="0" algn="ctr" defTabSz="666750">
-                  <a:lnSpc>
-                    <a:spcPct val="90000"/>
-                  </a:lnSpc>
-                  <a:spcBef>
-                    <a:spcPct val="0"/>
-                  </a:spcBef>
-                  <a:spcAft>
-                    <a:spcPct val="35000"/>
-                  </a:spcAft>
-                  <a:buNone/>
-                </a:pPr>
                 <a:r>
                   <a:rPr lang="en-GB" sz="1500" kern="1200" dirty="0">
                     <a:solidFill>
@@ -11691,44 +10734,6 @@
                   </a:rPr>
                   <a:t>Lesson 3 Login</a:t>
                 </a:r>
-              </a:p>
-              <a:p>
-                <a:pPr marL="0" lvl="0" indent="0" algn="ctr" defTabSz="666750">
-                  <a:lnSpc>
-                    <a:spcPct val="90000"/>
-                  </a:lnSpc>
-                  <a:spcBef>
-                    <a:spcPct val="0"/>
-                  </a:spcBef>
-                  <a:spcAft>
-                    <a:spcPct val="35000"/>
-                  </a:spcAft>
-                  <a:buNone/>
-                </a:pPr>
-                <a:endParaRPr lang="en-GB" sz="1500" kern="1200" dirty="0">
-                  <a:solidFill>
-                    <a:schemeClr val="tx1"/>
-                  </a:solidFill>
-                </a:endParaRPr>
-              </a:p>
-              <a:p>
-                <a:pPr marL="0" lvl="0" indent="0" algn="ctr" defTabSz="666750">
-                  <a:lnSpc>
-                    <a:spcPct val="90000"/>
-                  </a:lnSpc>
-                  <a:spcBef>
-                    <a:spcPct val="0"/>
-                  </a:spcBef>
-                  <a:spcAft>
-                    <a:spcPct val="35000"/>
-                  </a:spcAft>
-                  <a:buNone/>
-                </a:pPr>
-                <a:endParaRPr lang="en-GB" sz="1500" kern="1200" dirty="0">
-                  <a:solidFill>
-                    <a:schemeClr val="tx1"/>
-                  </a:solidFill>
-                </a:endParaRPr>
               </a:p>
               <a:p>
                 <a:pPr marL="0" lvl="0" indent="0" algn="ctr" defTabSz="666750">

</xml_diff>